<commit_message>
modified presentation, added mermaid diagrams
</commit_message>
<xml_diff>
--- a/ccg-presentation/CCG_Readout.pptx
+++ b/ccg-presentation/CCG_Readout.pptx
@@ -5,9 +5,10 @@
     <p:sldMasterId id="2147483648" r:id="rId1"/>
   </p:sldMasterIdLst>
   <p:sldIdLst>
-    <p:sldId id="256" r:id="rId7"/>
-    <p:sldId id="257" r:id="rId8"/>
-    <p:sldId id="258" r:id="rId9"/>
+    <p:sldId id="256" r:id="rId2"/>
+    <p:sldId id="262" r:id="rId3"/>
+    <p:sldId id="260" r:id="rId4"/>
+    <p:sldId id="261" r:id="rId5"/>
   </p:sldIdLst>
   <p:sldSz cx="9144000" cy="6858000" type="screen4x3"/>
   <p:notesSz cx="6858000" cy="9144000"/>
@@ -106,6 +107,22 @@
       </a:defRPr>
     </a:lvl9pPr>
   </p:defaultTextStyle>
+  <p:extLst>
+    <p:ext uri="{EFAFB233-063F-42B5-8137-9DF3F51BA10A}">
+      <p15:sldGuideLst xmlns:p15="http://schemas.microsoft.com/office/powerpoint/2012/main">
+        <p15:guide id="1" orient="horz" pos="2160">
+          <p15:clr>
+            <a:srgbClr val="A4A3A4"/>
+          </p15:clr>
+        </p15:guide>
+        <p15:guide id="2" pos="2880">
+          <p15:clr>
+            <a:srgbClr val="A4A3A4"/>
+          </p15:clr>
+        </p15:guide>
+      </p15:sldGuideLst>
+    </p:ext>
+  </p:extLst>
 </p:presentation>
 </file>
 
@@ -147,10 +164,9 @@
           <a:lstStyle/>
           <a:p>
             <a:r>
-              <a:rPr lang="en-US" smtClean="0"/>
+              <a:rPr lang="en-US"/>
               <a:t>Click to edit Master title style</a:t>
             </a:r>
-            <a:endParaRPr lang="en-US"/>
           </a:p>
         </p:txBody>
       </p:sp>
@@ -266,10 +282,9 @@
           </a:lstStyle>
           <a:p>
             <a:r>
-              <a:rPr lang="en-US" smtClean="0"/>
+              <a:rPr lang="en-US"/>
               <a:t>Click to edit Master subtitle style</a:t>
             </a:r>
-            <a:endParaRPr lang="en-US"/>
           </a:p>
         </p:txBody>
       </p:sp>
@@ -290,7 +305,7 @@
           <a:p>
             <a:fld id="{5BCAD085-E8A6-8845-BD4E-CB4CCA059FC4}" type="datetimeFigureOut">
               <a:rPr lang="en-US" smtClean="0"/>
-              <a:t>1/27/13</a:t>
+              <a:t>10/31/25</a:t>
             </a:fld>
             <a:endParaRPr lang="en-US"/>
           </a:p>
@@ -384,10 +399,9 @@
           <a:lstStyle/>
           <a:p>
             <a:r>
-              <a:rPr lang="en-US" smtClean="0"/>
+              <a:rPr lang="en-US"/>
               <a:t>Click to edit Master title style</a:t>
             </a:r>
-            <a:endParaRPr lang="en-US"/>
           </a:p>
         </p:txBody>
       </p:sp>
@@ -408,38 +422,37 @@
           <a:p>
             <a:pPr lvl="0"/>
             <a:r>
-              <a:rPr lang="en-US" smtClean="0"/>
+              <a:rPr lang="en-US"/>
               <a:t>Click to edit Master text styles</a:t>
             </a:r>
           </a:p>
           <a:p>
             <a:pPr lvl="1"/>
             <a:r>
-              <a:rPr lang="en-US" smtClean="0"/>
+              <a:rPr lang="en-US"/>
               <a:t>Second level</a:t>
             </a:r>
           </a:p>
           <a:p>
             <a:pPr lvl="2"/>
             <a:r>
-              <a:rPr lang="en-US" smtClean="0"/>
+              <a:rPr lang="en-US"/>
               <a:t>Third level</a:t>
             </a:r>
           </a:p>
           <a:p>
             <a:pPr lvl="3"/>
             <a:r>
-              <a:rPr lang="en-US" smtClean="0"/>
+              <a:rPr lang="en-US"/>
               <a:t>Fourth level</a:t>
             </a:r>
           </a:p>
           <a:p>
             <a:pPr lvl="4"/>
             <a:r>
-              <a:rPr lang="en-US" smtClean="0"/>
+              <a:rPr lang="en-US"/>
               <a:t>Fifth level</a:t>
             </a:r>
-            <a:endParaRPr lang="en-US"/>
           </a:p>
         </p:txBody>
       </p:sp>
@@ -460,7 +473,7 @@
           <a:p>
             <a:fld id="{5BCAD085-E8A6-8845-BD4E-CB4CCA059FC4}" type="datetimeFigureOut">
               <a:rPr lang="en-US" smtClean="0"/>
-              <a:t>1/27/13</a:t>
+              <a:t>10/31/25</a:t>
             </a:fld>
             <a:endParaRPr lang="en-US"/>
           </a:p>
@@ -559,10 +572,9 @@
           <a:lstStyle/>
           <a:p>
             <a:r>
-              <a:rPr lang="en-US" smtClean="0"/>
+              <a:rPr lang="en-US"/>
               <a:t>Click to edit Master title style</a:t>
             </a:r>
-            <a:endParaRPr lang="en-US"/>
           </a:p>
         </p:txBody>
       </p:sp>
@@ -588,38 +600,37 @@
           <a:p>
             <a:pPr lvl="0"/>
             <a:r>
-              <a:rPr lang="en-US" smtClean="0"/>
+              <a:rPr lang="en-US"/>
               <a:t>Click to edit Master text styles</a:t>
             </a:r>
           </a:p>
           <a:p>
             <a:pPr lvl="1"/>
             <a:r>
-              <a:rPr lang="en-US" smtClean="0"/>
+              <a:rPr lang="en-US"/>
               <a:t>Second level</a:t>
             </a:r>
           </a:p>
           <a:p>
             <a:pPr lvl="2"/>
             <a:r>
-              <a:rPr lang="en-US" smtClean="0"/>
+              <a:rPr lang="en-US"/>
               <a:t>Third level</a:t>
             </a:r>
           </a:p>
           <a:p>
             <a:pPr lvl="3"/>
             <a:r>
-              <a:rPr lang="en-US" smtClean="0"/>
+              <a:rPr lang="en-US"/>
               <a:t>Fourth level</a:t>
             </a:r>
           </a:p>
           <a:p>
             <a:pPr lvl="4"/>
             <a:r>
-              <a:rPr lang="en-US" smtClean="0"/>
+              <a:rPr lang="en-US"/>
               <a:t>Fifth level</a:t>
             </a:r>
-            <a:endParaRPr lang="en-US"/>
           </a:p>
         </p:txBody>
       </p:sp>
@@ -640,7 +651,7 @@
           <a:p>
             <a:fld id="{5BCAD085-E8A6-8845-BD4E-CB4CCA059FC4}" type="datetimeFigureOut">
               <a:rPr lang="en-US" smtClean="0"/>
-              <a:t>1/27/13</a:t>
+              <a:t>10/31/25</a:t>
             </a:fld>
             <a:endParaRPr lang="en-US"/>
           </a:p>
@@ -734,10 +745,9 @@
           <a:lstStyle/>
           <a:p>
             <a:r>
-              <a:rPr lang="en-US" smtClean="0"/>
+              <a:rPr lang="en-US"/>
               <a:t>Click to edit Master title style</a:t>
             </a:r>
-            <a:endParaRPr lang="en-US"/>
           </a:p>
         </p:txBody>
       </p:sp>
@@ -758,38 +768,37 @@
           <a:p>
             <a:pPr lvl="0"/>
             <a:r>
-              <a:rPr lang="en-US" smtClean="0"/>
+              <a:rPr lang="en-US"/>
               <a:t>Click to edit Master text styles</a:t>
             </a:r>
           </a:p>
           <a:p>
             <a:pPr lvl="1"/>
             <a:r>
-              <a:rPr lang="en-US" smtClean="0"/>
+              <a:rPr lang="en-US"/>
               <a:t>Second level</a:t>
             </a:r>
           </a:p>
           <a:p>
             <a:pPr lvl="2"/>
             <a:r>
-              <a:rPr lang="en-US" smtClean="0"/>
+              <a:rPr lang="en-US"/>
               <a:t>Third level</a:t>
             </a:r>
           </a:p>
           <a:p>
             <a:pPr lvl="3"/>
             <a:r>
-              <a:rPr lang="en-US" smtClean="0"/>
+              <a:rPr lang="en-US"/>
               <a:t>Fourth level</a:t>
             </a:r>
           </a:p>
           <a:p>
             <a:pPr lvl="4"/>
             <a:r>
-              <a:rPr lang="en-US" smtClean="0"/>
+              <a:rPr lang="en-US"/>
               <a:t>Fifth level</a:t>
             </a:r>
-            <a:endParaRPr lang="en-US"/>
           </a:p>
         </p:txBody>
       </p:sp>
@@ -810,7 +819,7 @@
           <a:p>
             <a:fld id="{5BCAD085-E8A6-8845-BD4E-CB4CCA059FC4}" type="datetimeFigureOut">
               <a:rPr lang="en-US" smtClean="0"/>
-              <a:t>1/27/13</a:t>
+              <a:t>10/31/25</a:t>
             </a:fld>
             <a:endParaRPr lang="en-US"/>
           </a:p>
@@ -913,10 +922,9 @@
           </a:lstStyle>
           <a:p>
             <a:r>
-              <a:rPr lang="en-US" smtClean="0"/>
+              <a:rPr lang="en-US"/>
               <a:t>Click to edit Master title style</a:t>
             </a:r>
-            <a:endParaRPr lang="en-US"/>
           </a:p>
         </p:txBody>
       </p:sp>
@@ -1033,7 +1041,7 @@
           <a:p>
             <a:pPr lvl="0"/>
             <a:r>
-              <a:rPr lang="en-US" smtClean="0"/>
+              <a:rPr lang="en-US"/>
               <a:t>Click to edit Master text styles</a:t>
             </a:r>
           </a:p>
@@ -1056,7 +1064,7 @@
           <a:p>
             <a:fld id="{5BCAD085-E8A6-8845-BD4E-CB4CCA059FC4}" type="datetimeFigureOut">
               <a:rPr lang="en-US" smtClean="0"/>
-              <a:t>1/27/13</a:t>
+              <a:t>10/31/25</a:t>
             </a:fld>
             <a:endParaRPr lang="en-US"/>
           </a:p>
@@ -1150,10 +1158,9 @@
           <a:lstStyle/>
           <a:p>
             <a:r>
-              <a:rPr lang="en-US" smtClean="0"/>
+              <a:rPr lang="en-US"/>
               <a:t>Click to edit Master title style</a:t>
             </a:r>
-            <a:endParaRPr lang="en-US"/>
           </a:p>
         </p:txBody>
       </p:sp>
@@ -1207,38 +1214,37 @@
           <a:p>
             <a:pPr lvl="0"/>
             <a:r>
-              <a:rPr lang="en-US" smtClean="0"/>
+              <a:rPr lang="en-US"/>
               <a:t>Click to edit Master text styles</a:t>
             </a:r>
           </a:p>
           <a:p>
             <a:pPr lvl="1"/>
             <a:r>
-              <a:rPr lang="en-US" smtClean="0"/>
+              <a:rPr lang="en-US"/>
               <a:t>Second level</a:t>
             </a:r>
           </a:p>
           <a:p>
             <a:pPr lvl="2"/>
             <a:r>
-              <a:rPr lang="en-US" smtClean="0"/>
+              <a:rPr lang="en-US"/>
               <a:t>Third level</a:t>
             </a:r>
           </a:p>
           <a:p>
             <a:pPr lvl="3"/>
             <a:r>
-              <a:rPr lang="en-US" smtClean="0"/>
+              <a:rPr lang="en-US"/>
               <a:t>Fourth level</a:t>
             </a:r>
           </a:p>
           <a:p>
             <a:pPr lvl="4"/>
             <a:r>
-              <a:rPr lang="en-US" smtClean="0"/>
+              <a:rPr lang="en-US"/>
               <a:t>Fifth level</a:t>
             </a:r>
-            <a:endParaRPr lang="en-US"/>
           </a:p>
         </p:txBody>
       </p:sp>
@@ -1292,38 +1298,37 @@
           <a:p>
             <a:pPr lvl="0"/>
             <a:r>
-              <a:rPr lang="en-US" smtClean="0"/>
+              <a:rPr lang="en-US"/>
               <a:t>Click to edit Master text styles</a:t>
             </a:r>
           </a:p>
           <a:p>
             <a:pPr lvl="1"/>
             <a:r>
-              <a:rPr lang="en-US" smtClean="0"/>
+              <a:rPr lang="en-US"/>
               <a:t>Second level</a:t>
             </a:r>
           </a:p>
           <a:p>
             <a:pPr lvl="2"/>
             <a:r>
-              <a:rPr lang="en-US" smtClean="0"/>
+              <a:rPr lang="en-US"/>
               <a:t>Third level</a:t>
             </a:r>
           </a:p>
           <a:p>
             <a:pPr lvl="3"/>
             <a:r>
-              <a:rPr lang="en-US" smtClean="0"/>
+              <a:rPr lang="en-US"/>
               <a:t>Fourth level</a:t>
             </a:r>
           </a:p>
           <a:p>
             <a:pPr lvl="4"/>
             <a:r>
-              <a:rPr lang="en-US" smtClean="0"/>
+              <a:rPr lang="en-US"/>
               <a:t>Fifth level</a:t>
             </a:r>
-            <a:endParaRPr lang="en-US"/>
           </a:p>
         </p:txBody>
       </p:sp>
@@ -1344,7 +1349,7 @@
           <a:p>
             <a:fld id="{5BCAD085-E8A6-8845-BD4E-CB4CCA059FC4}" type="datetimeFigureOut">
               <a:rPr lang="en-US" smtClean="0"/>
-              <a:t>1/27/13</a:t>
+              <a:t>10/31/25</a:t>
             </a:fld>
             <a:endParaRPr lang="en-US"/>
           </a:p>
@@ -1442,10 +1447,9 @@
           </a:lstStyle>
           <a:p>
             <a:r>
-              <a:rPr lang="en-US" smtClean="0"/>
+              <a:rPr lang="en-US"/>
               <a:t>Click to edit Master title style</a:t>
             </a:r>
-            <a:endParaRPr lang="en-US"/>
           </a:p>
         </p:txBody>
       </p:sp>
@@ -1508,7 +1512,7 @@
           <a:p>
             <a:pPr lvl="0"/>
             <a:r>
-              <a:rPr lang="en-US" smtClean="0"/>
+              <a:rPr lang="en-US"/>
               <a:t>Click to edit Master text styles</a:t>
             </a:r>
           </a:p>
@@ -1564,38 +1568,37 @@
           <a:p>
             <a:pPr lvl="0"/>
             <a:r>
-              <a:rPr lang="en-US" smtClean="0"/>
+              <a:rPr lang="en-US"/>
               <a:t>Click to edit Master text styles</a:t>
             </a:r>
           </a:p>
           <a:p>
             <a:pPr lvl="1"/>
             <a:r>
-              <a:rPr lang="en-US" smtClean="0"/>
+              <a:rPr lang="en-US"/>
               <a:t>Second level</a:t>
             </a:r>
           </a:p>
           <a:p>
             <a:pPr lvl="2"/>
             <a:r>
-              <a:rPr lang="en-US" smtClean="0"/>
+              <a:rPr lang="en-US"/>
               <a:t>Third level</a:t>
             </a:r>
           </a:p>
           <a:p>
             <a:pPr lvl="3"/>
             <a:r>
-              <a:rPr lang="en-US" smtClean="0"/>
+              <a:rPr lang="en-US"/>
               <a:t>Fourth level</a:t>
             </a:r>
           </a:p>
           <a:p>
             <a:pPr lvl="4"/>
             <a:r>
-              <a:rPr lang="en-US" smtClean="0"/>
+              <a:rPr lang="en-US"/>
               <a:t>Fifth level</a:t>
             </a:r>
-            <a:endParaRPr lang="en-US"/>
           </a:p>
         </p:txBody>
       </p:sp>
@@ -1658,7 +1661,7 @@
           <a:p>
             <a:pPr lvl="0"/>
             <a:r>
-              <a:rPr lang="en-US" smtClean="0"/>
+              <a:rPr lang="en-US"/>
               <a:t>Click to edit Master text styles</a:t>
             </a:r>
           </a:p>
@@ -1714,38 +1717,37 @@
           <a:p>
             <a:pPr lvl="0"/>
             <a:r>
-              <a:rPr lang="en-US" smtClean="0"/>
+              <a:rPr lang="en-US"/>
               <a:t>Click to edit Master text styles</a:t>
             </a:r>
           </a:p>
           <a:p>
             <a:pPr lvl="1"/>
             <a:r>
-              <a:rPr lang="en-US" smtClean="0"/>
+              <a:rPr lang="en-US"/>
               <a:t>Second level</a:t>
             </a:r>
           </a:p>
           <a:p>
             <a:pPr lvl="2"/>
             <a:r>
-              <a:rPr lang="en-US" smtClean="0"/>
+              <a:rPr lang="en-US"/>
               <a:t>Third level</a:t>
             </a:r>
           </a:p>
           <a:p>
             <a:pPr lvl="3"/>
             <a:r>
-              <a:rPr lang="en-US" smtClean="0"/>
+              <a:rPr lang="en-US"/>
               <a:t>Fourth level</a:t>
             </a:r>
           </a:p>
           <a:p>
             <a:pPr lvl="4"/>
             <a:r>
-              <a:rPr lang="en-US" smtClean="0"/>
+              <a:rPr lang="en-US"/>
               <a:t>Fifth level</a:t>
             </a:r>
-            <a:endParaRPr lang="en-US"/>
           </a:p>
         </p:txBody>
       </p:sp>
@@ -1766,7 +1768,7 @@
           <a:p>
             <a:fld id="{5BCAD085-E8A6-8845-BD4E-CB4CCA059FC4}" type="datetimeFigureOut">
               <a:rPr lang="en-US" smtClean="0"/>
-              <a:t>1/27/13</a:t>
+              <a:t>10/31/25</a:t>
             </a:fld>
             <a:endParaRPr lang="en-US"/>
           </a:p>
@@ -1860,10 +1862,9 @@
           <a:lstStyle/>
           <a:p>
             <a:r>
-              <a:rPr lang="en-US" smtClean="0"/>
+              <a:rPr lang="en-US"/>
               <a:t>Click to edit Master title style</a:t>
             </a:r>
-            <a:endParaRPr lang="en-US"/>
           </a:p>
         </p:txBody>
       </p:sp>
@@ -1884,7 +1885,7 @@
           <a:p>
             <a:fld id="{5BCAD085-E8A6-8845-BD4E-CB4CCA059FC4}" type="datetimeFigureOut">
               <a:rPr lang="en-US" smtClean="0"/>
-              <a:t>1/27/13</a:t>
+              <a:t>10/31/25</a:t>
             </a:fld>
             <a:endParaRPr lang="en-US"/>
           </a:p>
@@ -1979,7 +1980,7 @@
           <a:p>
             <a:fld id="{5BCAD085-E8A6-8845-BD4E-CB4CCA059FC4}" type="datetimeFigureOut">
               <a:rPr lang="en-US" smtClean="0"/>
-              <a:t>1/27/13</a:t>
+              <a:t>10/31/25</a:t>
             </a:fld>
             <a:endParaRPr lang="en-US"/>
           </a:p>
@@ -2082,10 +2083,9 @@
           </a:lstStyle>
           <a:p>
             <a:r>
-              <a:rPr lang="en-US" smtClean="0"/>
+              <a:rPr lang="en-US"/>
               <a:t>Click to edit Master title style</a:t>
             </a:r>
-            <a:endParaRPr lang="en-US"/>
           </a:p>
         </p:txBody>
       </p:sp>
@@ -2139,38 +2139,37 @@
           <a:p>
             <a:pPr lvl="0"/>
             <a:r>
-              <a:rPr lang="en-US" smtClean="0"/>
+              <a:rPr lang="en-US"/>
               <a:t>Click to edit Master text styles</a:t>
             </a:r>
           </a:p>
           <a:p>
             <a:pPr lvl="1"/>
             <a:r>
-              <a:rPr lang="en-US" smtClean="0"/>
+              <a:rPr lang="en-US"/>
               <a:t>Second level</a:t>
             </a:r>
           </a:p>
           <a:p>
             <a:pPr lvl="2"/>
             <a:r>
-              <a:rPr lang="en-US" smtClean="0"/>
+              <a:rPr lang="en-US"/>
               <a:t>Third level</a:t>
             </a:r>
           </a:p>
           <a:p>
             <a:pPr lvl="3"/>
             <a:r>
-              <a:rPr lang="en-US" smtClean="0"/>
+              <a:rPr lang="en-US"/>
               <a:t>Fourth level</a:t>
             </a:r>
           </a:p>
           <a:p>
             <a:pPr lvl="4"/>
             <a:r>
-              <a:rPr lang="en-US" smtClean="0"/>
+              <a:rPr lang="en-US"/>
               <a:t>Fifth level</a:t>
             </a:r>
-            <a:endParaRPr lang="en-US"/>
           </a:p>
         </p:txBody>
       </p:sp>
@@ -2233,7 +2232,7 @@
           <a:p>
             <a:pPr lvl="0"/>
             <a:r>
-              <a:rPr lang="en-US" smtClean="0"/>
+              <a:rPr lang="en-US"/>
               <a:t>Click to edit Master text styles</a:t>
             </a:r>
           </a:p>
@@ -2256,7 +2255,7 @@
           <a:p>
             <a:fld id="{5BCAD085-E8A6-8845-BD4E-CB4CCA059FC4}" type="datetimeFigureOut">
               <a:rPr lang="en-US" smtClean="0"/>
-              <a:t>1/27/13</a:t>
+              <a:t>10/31/25</a:t>
             </a:fld>
             <a:endParaRPr lang="en-US"/>
           </a:p>
@@ -2359,10 +2358,9 @@
           </a:lstStyle>
           <a:p>
             <a:r>
-              <a:rPr lang="en-US" smtClean="0"/>
+              <a:rPr lang="en-US"/>
               <a:t>Click to edit Master title style</a:t>
             </a:r>
-            <a:endParaRPr lang="en-US"/>
           </a:p>
         </p:txBody>
       </p:sp>
@@ -2486,7 +2484,7 @@
           <a:p>
             <a:pPr lvl="0"/>
             <a:r>
-              <a:rPr lang="en-US" smtClean="0"/>
+              <a:rPr lang="en-US"/>
               <a:t>Click to edit Master text styles</a:t>
             </a:r>
           </a:p>
@@ -2509,7 +2507,7 @@
           <a:p>
             <a:fld id="{5BCAD085-E8A6-8845-BD4E-CB4CCA059FC4}" type="datetimeFigureOut">
               <a:rPr lang="en-US" smtClean="0"/>
-              <a:t>1/27/13</a:t>
+              <a:t>10/31/25</a:t>
             </a:fld>
             <a:endParaRPr lang="en-US"/>
           </a:p>
@@ -2618,10 +2616,9 @@
           <a:lstStyle/>
           <a:p>
             <a:r>
-              <a:rPr lang="en-US" smtClean="0"/>
+              <a:rPr lang="en-US"/>
               <a:t>Click to edit Master title style</a:t>
             </a:r>
-            <a:endParaRPr lang="en-US"/>
           </a:p>
         </p:txBody>
       </p:sp>
@@ -2652,38 +2649,37 @@
           <a:p>
             <a:pPr lvl="0"/>
             <a:r>
-              <a:rPr lang="en-US" smtClean="0"/>
+              <a:rPr lang="en-US"/>
               <a:t>Click to edit Master text styles</a:t>
             </a:r>
           </a:p>
           <a:p>
             <a:pPr lvl="1"/>
             <a:r>
-              <a:rPr lang="en-US" smtClean="0"/>
+              <a:rPr lang="en-US"/>
               <a:t>Second level</a:t>
             </a:r>
           </a:p>
           <a:p>
             <a:pPr lvl="2"/>
             <a:r>
-              <a:rPr lang="en-US" smtClean="0"/>
+              <a:rPr lang="en-US"/>
               <a:t>Third level</a:t>
             </a:r>
           </a:p>
           <a:p>
             <a:pPr lvl="3"/>
             <a:r>
-              <a:rPr lang="en-US" smtClean="0"/>
+              <a:rPr lang="en-US"/>
               <a:t>Fourth level</a:t>
             </a:r>
           </a:p>
           <a:p>
             <a:pPr lvl="4"/>
             <a:r>
-              <a:rPr lang="en-US" smtClean="0"/>
+              <a:rPr lang="en-US"/>
               <a:t>Fifth level</a:t>
             </a:r>
-            <a:endParaRPr lang="en-US"/>
           </a:p>
         </p:txBody>
       </p:sp>
@@ -2722,7 +2718,7 @@
           <a:p>
             <a:fld id="{5BCAD085-E8A6-8845-BD4E-CB4CCA059FC4}" type="datetimeFigureOut">
               <a:rPr lang="en-US" smtClean="0"/>
-              <a:t>1/27/13</a:t>
+              <a:t>10/31/25</a:t>
             </a:fld>
             <a:endParaRPr lang="en-US"/>
           </a:p>
@@ -3081,7 +3077,7 @@
 </file>
 
 <file path=ppt/slides/slide1.xml><?xml version="1.0" encoding="utf-8"?>
-<p:sld xmlns:a="http://schemas.openxmlformats.org/drawingml/2006/main" xmlns:p="http://schemas.openxmlformats.org/presentationml/2006/main" xmlns:r="http://schemas.openxmlformats.org/officeDocument/2006/relationships">
+<p:sld xmlns:a="http://schemas.openxmlformats.org/drawingml/2006/main" xmlns:r="http://schemas.openxmlformats.org/officeDocument/2006/relationships" xmlns:p="http://schemas.openxmlformats.org/presentationml/2006/main">
   <p:cSld>
     <p:spTree>
       <p:nvGrpSpPr>
@@ -3089,7 +3085,14 @@
         <p:cNvGrpSpPr/>
         <p:nvPr/>
       </p:nvGrpSpPr>
-      <p:grpSpPr/>
+      <p:grpSpPr>
+        <a:xfrm>
+          <a:off x="0" y="0"/>
+          <a:ext cx="0" cy="0"/>
+          <a:chOff x="0" y="0"/>
+          <a:chExt cx="0" cy="0"/>
+        </a:xfrm>
+      </p:grpSpPr>
       <p:sp>
         <p:nvSpPr>
           <p:cNvPr id="2" name="Title 1"/>
@@ -3102,7 +3105,9 @@
         </p:nvSpPr>
         <p:spPr/>
         <p:txBody>
-          <a:bodyPr/>
+          <a:bodyPr>
+            <a:normAutofit fontScale="90000"/>
+          </a:bodyPr>
           <a:lstStyle/>
           <a:p>
             <a:r>
@@ -3127,8 +3132,14 @@
           <a:lstStyle/>
           <a:p>
             <a:r>
-              <a:t>Context-aware missing-time detection | Team X</a:t>
-            </a:r>
+              <a:rPr dirty="0"/>
+              <a:t>Context-aware missing-time detection | Team </a:t>
+            </a:r>
+            <a:r>
+              <a:rPr lang="en-CA" dirty="0"/>
+              <a:t>Awesome</a:t>
+            </a:r>
+            <a:endParaRPr dirty="0"/>
           </a:p>
         </p:txBody>
       </p:sp>
@@ -3141,7 +3152,7 @@
 </file>
 
 <file path=ppt/slides/slide2.xml><?xml version="1.0" encoding="utf-8"?>
-<p:sld xmlns:a="http://schemas.openxmlformats.org/drawingml/2006/main" xmlns:p="http://schemas.openxmlformats.org/presentationml/2006/main" xmlns:r="http://schemas.openxmlformats.org/officeDocument/2006/relationships">
+<p:sld xmlns:a="http://schemas.openxmlformats.org/drawingml/2006/main" xmlns:r="http://schemas.openxmlformats.org/officeDocument/2006/relationships" xmlns:p="http://schemas.openxmlformats.org/presentationml/2006/main">
   <p:cSld>
     <p:spTree>
       <p:nvGrpSpPr>
@@ -3149,10 +3160,23 @@
         <p:cNvGrpSpPr/>
         <p:nvPr/>
       </p:nvGrpSpPr>
-      <p:grpSpPr/>
-      <p:sp>
-        <p:nvSpPr>
-          <p:cNvPr id="2" name="Title 1"/>
+      <p:grpSpPr>
+        <a:xfrm>
+          <a:off x="0" y="0"/>
+          <a:ext cx="0" cy="0"/>
+          <a:chOff x="0" y="0"/>
+          <a:chExt cx="0" cy="0"/>
+        </a:xfrm>
+      </p:grpSpPr>
+      <p:sp>
+        <p:nvSpPr>
+          <p:cNvPr id="2" name="Title 1">
+            <a:extLst>
+              <a:ext uri="{FF2B5EF4-FFF2-40B4-BE49-F238E27FC236}">
+                <a16:creationId xmlns:a16="http://schemas.microsoft.com/office/drawing/2014/main" id="{5EE2E313-8B26-579B-5772-A0A3AB552B7D}"/>
+              </a:ext>
+            </a:extLst>
+          </p:cNvPr>
           <p:cNvSpPr>
             <a:spLocks noGrp="1"/>
           </p:cNvSpPr>
@@ -3160,63 +3184,61 @@
             <p:ph type="title"/>
           </p:nvPr>
         </p:nvSpPr>
-        <p:spPr/>
-        <p:txBody>
-          <a:bodyPr/>
-          <a:lstStyle/>
-          <a:p>
-            <a:r>
-              <a:t>Solution — Agentic Flow &amp; Architecture</a:t>
-            </a:r>
-          </a:p>
-        </p:txBody>
-      </p:sp>
-      <p:sp>
-        <p:nvSpPr>
-          <p:cNvPr id="3" name="Content Placeholder 2"/>
-          <p:cNvSpPr>
-            <a:spLocks noGrp="1"/>
-          </p:cNvSpPr>
-          <p:nvPr>
-            <p:ph idx="1"/>
-          </p:nvPr>
-        </p:nvSpPr>
-        <p:spPr/>
-        <p:txBody>
-          <a:bodyPr/>
-          <a:lstStyle/>
-          <a:p>
-            <a:r>
-              <a:t>Inputs: Calendar events, timesheet entries, travel receipts (optional)</a:t>
-            </a:r>
-          </a:p>
-          <a:p>
-            <a:pPr lvl="1"/>
-            <a:r>
-              <a:t>Agentic Core: Azure OpenAI for reasoning + small orchestrator (Semantic Kernel or Python agent)</a:t>
-            </a:r>
-          </a:p>
-          <a:p>
-            <a:pPr lvl="1"/>
-            <a:r>
-              <a:t>Connectors: calendar, timesheet mock API</a:t>
-            </a:r>
-          </a:p>
-          <a:p>
-            <a:pPr lvl="1"/>
-            <a:r>
-              <a:t>Outputs: Suggested entries with rationale, one-click confirm flow, audit trail</a:t>
-            </a:r>
-          </a:p>
-          <a:p>
-            <a:pPr lvl="1"/>
-            <a:r>
-              <a:t>Agentic behaviors: reasoning, tool use, proactivity</a:t>
-            </a:r>
-          </a:p>
-        </p:txBody>
-      </p:sp>
+        <p:spPr>
+          <a:xfrm>
+            <a:off x="457200" y="274638"/>
+            <a:ext cx="8229600" cy="403054"/>
+          </a:xfrm>
+        </p:spPr>
+        <p:txBody>
+          <a:bodyPr>
+            <a:normAutofit fontScale="90000"/>
+          </a:bodyPr>
+          <a:lstStyle/>
+          <a:p>
+            <a:r>
+              <a:rPr lang="en-US" dirty="0"/>
+              <a:t>Architecture Diagram</a:t>
+            </a:r>
+          </a:p>
+        </p:txBody>
+      </p:sp>
+      <p:pic>
+        <p:nvPicPr>
+          <p:cNvPr id="5" name="Picture 4">
+            <a:extLst>
+              <a:ext uri="{FF2B5EF4-FFF2-40B4-BE49-F238E27FC236}">
+                <a16:creationId xmlns:a16="http://schemas.microsoft.com/office/drawing/2014/main" id="{E8DBE65A-FBDA-2BF5-0D15-813A1DAB8B5F}"/>
+              </a:ext>
+            </a:extLst>
+          </p:cNvPr>
+          <p:cNvPicPr>
+            <a:picLocks noChangeAspect="1"/>
+          </p:cNvPicPr>
+          <p:nvPr/>
+        </p:nvPicPr>
+        <p:blipFill>
+          <a:blip r:embed="rId2"/>
+          <a:stretch>
+            <a:fillRect/>
+          </a:stretch>
+        </p:blipFill>
+        <p:spPr>
+          <a:xfrm>
+            <a:off x="685800" y="1025992"/>
+            <a:ext cx="7772400" cy="5627107"/>
+          </a:xfrm>
+          <a:prstGeom prst="rect">
+            <a:avLst/>
+          </a:prstGeom>
+        </p:spPr>
+      </p:pic>
     </p:spTree>
+    <p:extLst>
+      <p:ext uri="{BB962C8B-B14F-4D97-AF65-F5344CB8AC3E}">
+        <p14:creationId xmlns:p14="http://schemas.microsoft.com/office/powerpoint/2010/main" val="669477550"/>
+      </p:ext>
+    </p:extLst>
   </p:cSld>
   <p:clrMapOvr>
     <a:masterClrMapping/>
@@ -3225,7 +3247,7 @@
 </file>
 
 <file path=ppt/slides/slide3.xml><?xml version="1.0" encoding="utf-8"?>
-<p:sld xmlns:a="http://schemas.openxmlformats.org/drawingml/2006/main" xmlns:p="http://schemas.openxmlformats.org/presentationml/2006/main" xmlns:r="http://schemas.openxmlformats.org/officeDocument/2006/relationships">
+<p:sld xmlns:a="http://schemas.openxmlformats.org/drawingml/2006/main" xmlns:r="http://schemas.openxmlformats.org/officeDocument/2006/relationships" xmlns:p="http://schemas.openxmlformats.org/presentationml/2006/main">
   <p:cSld>
     <p:spTree>
       <p:nvGrpSpPr>
@@ -3233,10 +3255,23 @@
         <p:cNvGrpSpPr/>
         <p:nvPr/>
       </p:nvGrpSpPr>
-      <p:grpSpPr/>
-      <p:sp>
-        <p:nvSpPr>
-          <p:cNvPr id="2" name="Title 1"/>
+      <p:grpSpPr>
+        <a:xfrm>
+          <a:off x="0" y="0"/>
+          <a:ext cx="0" cy="0"/>
+          <a:chOff x="0" y="0"/>
+          <a:chExt cx="0" cy="0"/>
+        </a:xfrm>
+      </p:grpSpPr>
+      <p:sp>
+        <p:nvSpPr>
+          <p:cNvPr id="2" name="Title 1">
+            <a:extLst>
+              <a:ext uri="{FF2B5EF4-FFF2-40B4-BE49-F238E27FC236}">
+                <a16:creationId xmlns:a16="http://schemas.microsoft.com/office/drawing/2014/main" id="{DCC781E2-DBAE-6F29-F34C-7BAF57C513B2}"/>
+              </a:ext>
+            </a:extLst>
+          </p:cNvPr>
           <p:cNvSpPr>
             <a:spLocks noGrp="1"/>
           </p:cNvSpPr>
@@ -3250,51 +3285,143 @@
           <a:lstStyle/>
           <a:p>
             <a:r>
-              <a:t>Demo &amp; Next Steps</a:t>
-            </a:r>
-          </a:p>
-        </p:txBody>
-      </p:sp>
-      <p:sp>
-        <p:nvSpPr>
-          <p:cNvPr id="3" name="Content Placeholder 2"/>
-          <p:cNvSpPr>
-            <a:spLocks noGrp="1"/>
-          </p:cNvSpPr>
-          <p:nvPr>
-            <p:ph idx="1"/>
-          </p:nvPr>
-        </p:nvSpPr>
-        <p:spPr/>
-        <p:txBody>
-          <a:bodyPr/>
-          <a:lstStyle/>
-          <a:p>
-            <a:r>
-              <a:t>Demo: 60s mock showing missing-time detection and confirm flow (mocked API)</a:t>
-            </a:r>
-          </a:p>
-          <a:p>
-            <a:pPr lvl="1"/>
-            <a:r>
-              <a:t>Impact: reduce missed billable time and manager reconciliation effort</a:t>
-            </a:r>
-          </a:p>
-          <a:p>
-            <a:pPr lvl="1"/>
-            <a:r>
-              <a:t>Next steps: pilot with 10 consultants; integrate real calendar + timesheet sandbox</a:t>
-            </a:r>
-          </a:p>
-          <a:p>
-            <a:pPr lvl="1"/>
-            <a:r>
-              <a:t>Ask: access to sample calendar data and a timesheet test sandbox</a:t>
-            </a:r>
-          </a:p>
-        </p:txBody>
-      </p:sp>
+              <a:rPr lang="en-US" dirty="0"/>
+              <a:t>Flow Diagram</a:t>
+            </a:r>
+          </a:p>
+        </p:txBody>
+      </p:sp>
+      <p:pic>
+        <p:nvPicPr>
+          <p:cNvPr id="5" name="Picture 4">
+            <a:extLst>
+              <a:ext uri="{FF2B5EF4-FFF2-40B4-BE49-F238E27FC236}">
+                <a16:creationId xmlns:a16="http://schemas.microsoft.com/office/drawing/2014/main" id="{DDEB5D3F-5E0A-9784-38EE-FA3B163E3596}"/>
+              </a:ext>
+            </a:extLst>
+          </p:cNvPr>
+          <p:cNvPicPr>
+            <a:picLocks noChangeAspect="1"/>
+          </p:cNvPicPr>
+          <p:nvPr/>
+        </p:nvPicPr>
+        <p:blipFill>
+          <a:blip r:embed="rId2"/>
+          <a:stretch>
+            <a:fillRect/>
+          </a:stretch>
+        </p:blipFill>
+        <p:spPr>
+          <a:xfrm>
+            <a:off x="0" y="2339185"/>
+            <a:ext cx="9088015" cy="1817603"/>
+          </a:xfrm>
+          <a:prstGeom prst="rect">
+            <a:avLst/>
+          </a:prstGeom>
+        </p:spPr>
+      </p:pic>
     </p:spTree>
+    <p:extLst>
+      <p:ext uri="{BB962C8B-B14F-4D97-AF65-F5344CB8AC3E}">
+        <p14:creationId xmlns:p14="http://schemas.microsoft.com/office/powerpoint/2010/main" val="574477057"/>
+      </p:ext>
+    </p:extLst>
+  </p:cSld>
+  <p:clrMapOvr>
+    <a:masterClrMapping/>
+  </p:clrMapOvr>
+</p:sld>
+</file>
+
+<file path=ppt/slides/slide4.xml><?xml version="1.0" encoding="utf-8"?>
+<p:sld xmlns:a="http://schemas.openxmlformats.org/drawingml/2006/main" xmlns:r="http://schemas.openxmlformats.org/officeDocument/2006/relationships" xmlns:p="http://schemas.openxmlformats.org/presentationml/2006/main">
+  <p:cSld>
+    <p:spTree>
+      <p:nvGrpSpPr>
+        <p:cNvPr id="1" name=""/>
+        <p:cNvGrpSpPr/>
+        <p:nvPr/>
+      </p:nvGrpSpPr>
+      <p:grpSpPr>
+        <a:xfrm>
+          <a:off x="0" y="0"/>
+          <a:ext cx="0" cy="0"/>
+          <a:chOff x="0" y="0"/>
+          <a:chExt cx="0" cy="0"/>
+        </a:xfrm>
+      </p:grpSpPr>
+      <p:sp>
+        <p:nvSpPr>
+          <p:cNvPr id="2" name="Title 1">
+            <a:extLst>
+              <a:ext uri="{FF2B5EF4-FFF2-40B4-BE49-F238E27FC236}">
+                <a16:creationId xmlns:a16="http://schemas.microsoft.com/office/drawing/2014/main" id="{AE58C28B-87F5-F0F5-71E0-D3F7E6B82B72}"/>
+              </a:ext>
+            </a:extLst>
+          </p:cNvPr>
+          <p:cNvSpPr>
+            <a:spLocks noGrp="1"/>
+          </p:cNvSpPr>
+          <p:nvPr>
+            <p:ph type="title"/>
+          </p:nvPr>
+        </p:nvSpPr>
+        <p:spPr>
+          <a:xfrm>
+            <a:off x="457200" y="274638"/>
+            <a:ext cx="8229600" cy="537125"/>
+          </a:xfrm>
+        </p:spPr>
+        <p:txBody>
+          <a:bodyPr>
+            <a:normAutofit fontScale="90000"/>
+          </a:bodyPr>
+          <a:lstStyle/>
+          <a:p>
+            <a:r>
+              <a:rPr lang="en-US" dirty="0"/>
+              <a:t>Sequence Diagram</a:t>
+            </a:r>
+          </a:p>
+        </p:txBody>
+      </p:sp>
+      <p:pic>
+        <p:nvPicPr>
+          <p:cNvPr id="5" name="Picture 4">
+            <a:extLst>
+              <a:ext uri="{FF2B5EF4-FFF2-40B4-BE49-F238E27FC236}">
+                <a16:creationId xmlns:a16="http://schemas.microsoft.com/office/drawing/2014/main" id="{AAADC5DF-6C32-99A6-3987-905549EB16ED}"/>
+              </a:ext>
+            </a:extLst>
+          </p:cNvPr>
+          <p:cNvPicPr>
+            <a:picLocks noChangeAspect="1"/>
+          </p:cNvPicPr>
+          <p:nvPr/>
+        </p:nvPicPr>
+        <p:blipFill>
+          <a:blip r:embed="rId2"/>
+          <a:stretch>
+            <a:fillRect/>
+          </a:stretch>
+        </p:blipFill>
+        <p:spPr>
+          <a:xfrm>
+            <a:off x="844420" y="863081"/>
+            <a:ext cx="7772400" cy="5850275"/>
+          </a:xfrm>
+          <a:prstGeom prst="rect">
+            <a:avLst/>
+          </a:prstGeom>
+        </p:spPr>
+      </p:pic>
+    </p:spTree>
+    <p:extLst>
+      <p:ext uri="{BB962C8B-B14F-4D97-AF65-F5344CB8AC3E}">
+        <p14:creationId xmlns:p14="http://schemas.microsoft.com/office/powerpoint/2010/main" val="3020544105"/>
+      </p:ext>
+    </p:extLst>
   </p:cSld>
   <p:clrMapOvr>
     <a:masterClrMapping/>
@@ -3620,4 +3747,10 @@
   </a:objectDefaults>
   <a:extraClrSchemeLst/>
 </a:theme>
+</file>
+
+<file path=docMetadata/LabelInfo.xml><?xml version="1.0" encoding="utf-8"?>
+<clbl:labelList xmlns:clbl="http://schemas.microsoft.com/office/2020/mipLabelMetadata">
+  <clbl:label id="{f42aa342-8706-4288-bd11-ebb85995028c}" enabled="1" method="Standard" siteId="{72f988bf-86f1-41af-91ab-2d7cd011db47}" contentBits="0" removed="0"/>
+</clbl:labelList>
 </file>
</xml_diff>

<commit_message>
new approval agent work
</commit_message>
<xml_diff>
--- a/ccg-presentation/CCG_Readout.pptx
+++ b/ccg-presentation/CCG_Readout.pptx
@@ -9,8 +9,9 @@
     <p:sldId id="262" r:id="rId3"/>
     <p:sldId id="260" r:id="rId4"/>
     <p:sldId id="261" r:id="rId5"/>
+    <p:sldId id="263" r:id="rId6"/>
   </p:sldIdLst>
-  <p:sldSz cx="9144000" cy="6858000" type="screen4x3"/>
+  <p:sldSz cx="12192000" cy="6858000"/>
   <p:notesSz cx="6858000" cy="9144000"/>
   <p:defaultTextStyle>
     <a:defPPr>
@@ -108,14 +109,35 @@
     </a:lvl9pPr>
   </p:defaultTextStyle>
   <p:extLst>
+    <p:ext uri="{521415D9-36F7-43E2-AB2F-B90AF26B5E84}">
+      <p14:sectionLst xmlns:p14="http://schemas.microsoft.com/office/powerpoint/2010/main">
+        <p14:section name="Default Section" id="{AF26F20B-C463-0349-B3F4-28E85F07C8D9}">
+          <p14:sldIdLst>
+            <p14:sldId id="256"/>
+          </p14:sldIdLst>
+        </p14:section>
+        <p14:section name="SINGLE AGENT SOLUTION" id="{4D64E129-12EB-1547-992A-4FFB90BB2CA9}">
+          <p14:sldIdLst>
+            <p14:sldId id="262"/>
+            <p14:sldId id="260"/>
+            <p14:sldId id="261"/>
+          </p14:sldIdLst>
+        </p14:section>
+        <p14:section name="MULTI-AGENT SOLUTION" id="{C5241651-0464-AA44-A89A-AD0B10E3611B}">
+          <p14:sldIdLst>
+            <p14:sldId id="263"/>
+          </p14:sldIdLst>
+        </p14:section>
+      </p14:sectionLst>
+    </p:ext>
     <p:ext uri="{EFAFB233-063F-42B5-8137-9DF3F51BA10A}">
       <p15:sldGuideLst xmlns:p15="http://schemas.microsoft.com/office/powerpoint/2012/main">
-        <p15:guide id="1" orient="horz" pos="2160">
+        <p15:guide id="1" orient="horz" pos="2160" userDrawn="1">
           <p15:clr>
             <a:srgbClr val="A4A3A4"/>
           </p15:clr>
         </p15:guide>
-        <p15:guide id="2" pos="2880">
+        <p15:guide id="2" pos="3840" userDrawn="1">
           <p15:clr>
             <a:srgbClr val="A4A3A4"/>
           </p15:clr>
@@ -155,8 +177,8 @@
         </p:nvSpPr>
         <p:spPr>
           <a:xfrm>
-            <a:off x="685800" y="2130425"/>
-            <a:ext cx="7772400" cy="1470025"/>
+            <a:off x="914400" y="2130426"/>
+            <a:ext cx="10363200" cy="1470025"/>
           </a:xfrm>
         </p:spPr>
         <p:txBody>
@@ -182,8 +204,8 @@
         </p:nvSpPr>
         <p:spPr>
           <a:xfrm>
-            <a:off x="1371600" y="3886200"/>
-            <a:ext cx="6400800" cy="1752600"/>
+            <a:off x="1828800" y="3886200"/>
+            <a:ext cx="8534400" cy="1752600"/>
           </a:xfrm>
         </p:spPr>
         <p:txBody>
@@ -305,7 +327,7 @@
           <a:p>
             <a:fld id="{5BCAD085-E8A6-8845-BD4E-CB4CCA059FC4}" type="datetimeFigureOut">
               <a:rPr lang="en-US" smtClean="0"/>
-              <a:t>10/31/25</a:t>
+              <a:t>11/1/25</a:t>
             </a:fld>
             <a:endParaRPr lang="en-US"/>
           </a:p>
@@ -473,7 +495,7 @@
           <a:p>
             <a:fld id="{5BCAD085-E8A6-8845-BD4E-CB4CCA059FC4}" type="datetimeFigureOut">
               <a:rPr lang="en-US" smtClean="0"/>
-              <a:t>10/31/25</a:t>
+              <a:t>11/1/25</a:t>
             </a:fld>
             <a:endParaRPr lang="en-US"/>
           </a:p>
@@ -563,8 +585,8 @@
         </p:nvSpPr>
         <p:spPr>
           <a:xfrm>
-            <a:off x="6629400" y="274638"/>
-            <a:ext cx="2057400" cy="5851525"/>
+            <a:off x="8839200" y="274639"/>
+            <a:ext cx="2743200" cy="5851525"/>
           </a:xfrm>
         </p:spPr>
         <p:txBody>
@@ -590,8 +612,8 @@
         </p:nvSpPr>
         <p:spPr>
           <a:xfrm>
-            <a:off x="457200" y="274638"/>
-            <a:ext cx="6019800" cy="5851525"/>
+            <a:off x="609600" y="274639"/>
+            <a:ext cx="8026400" cy="5851525"/>
           </a:xfrm>
         </p:spPr>
         <p:txBody>
@@ -651,7 +673,7 @@
           <a:p>
             <a:fld id="{5BCAD085-E8A6-8845-BD4E-CB4CCA059FC4}" type="datetimeFigureOut">
               <a:rPr lang="en-US" smtClean="0"/>
-              <a:t>10/31/25</a:t>
+              <a:t>11/1/25</a:t>
             </a:fld>
             <a:endParaRPr lang="en-US"/>
           </a:p>
@@ -819,7 +841,7 @@
           <a:p>
             <a:fld id="{5BCAD085-E8A6-8845-BD4E-CB4CCA059FC4}" type="datetimeFigureOut">
               <a:rPr lang="en-US" smtClean="0"/>
-              <a:t>10/31/25</a:t>
+              <a:t>11/1/25</a:t>
             </a:fld>
             <a:endParaRPr lang="en-US"/>
           </a:p>
@@ -909,8 +931,8 @@
         </p:nvSpPr>
         <p:spPr>
           <a:xfrm>
-            <a:off x="722313" y="4406900"/>
-            <a:ext cx="7772400" cy="1362075"/>
+            <a:off x="963084" y="4406901"/>
+            <a:ext cx="10363200" cy="1362075"/>
           </a:xfrm>
         </p:spPr>
         <p:txBody>
@@ -940,8 +962,8 @@
         </p:nvSpPr>
         <p:spPr>
           <a:xfrm>
-            <a:off x="722313" y="2906713"/>
-            <a:ext cx="7772400" cy="1500187"/>
+            <a:off x="963084" y="2906713"/>
+            <a:ext cx="10363200" cy="1500187"/>
           </a:xfrm>
         </p:spPr>
         <p:txBody>
@@ -1064,7 +1086,7 @@
           <a:p>
             <a:fld id="{5BCAD085-E8A6-8845-BD4E-CB4CCA059FC4}" type="datetimeFigureOut">
               <a:rPr lang="en-US" smtClean="0"/>
-              <a:t>10/31/25</a:t>
+              <a:t>11/1/25</a:t>
             </a:fld>
             <a:endParaRPr lang="en-US"/>
           </a:p>
@@ -1176,8 +1198,8 @@
         </p:nvSpPr>
         <p:spPr>
           <a:xfrm>
-            <a:off x="457200" y="1600200"/>
-            <a:ext cx="4038600" cy="4525963"/>
+            <a:off x="609600" y="1600201"/>
+            <a:ext cx="5384800" cy="4525963"/>
           </a:xfrm>
         </p:spPr>
         <p:txBody>
@@ -1260,8 +1282,8 @@
         </p:nvSpPr>
         <p:spPr>
           <a:xfrm>
-            <a:off x="4648200" y="1600200"/>
-            <a:ext cx="4038600" cy="4525963"/>
+            <a:off x="6197600" y="1600201"/>
+            <a:ext cx="5384800" cy="4525963"/>
           </a:xfrm>
         </p:spPr>
         <p:txBody>
@@ -1349,7 +1371,7 @@
           <a:p>
             <a:fld id="{5BCAD085-E8A6-8845-BD4E-CB4CCA059FC4}" type="datetimeFigureOut">
               <a:rPr lang="en-US" smtClean="0"/>
-              <a:t>10/31/25</a:t>
+              <a:t>11/1/25</a:t>
             </a:fld>
             <a:endParaRPr lang="en-US"/>
           </a:p>
@@ -1465,8 +1487,8 @@
         </p:nvSpPr>
         <p:spPr>
           <a:xfrm>
-            <a:off x="457200" y="1535113"/>
-            <a:ext cx="4040188" cy="639762"/>
+            <a:off x="609600" y="1535113"/>
+            <a:ext cx="5386917" cy="639762"/>
           </a:xfrm>
         </p:spPr>
         <p:txBody>
@@ -1530,8 +1552,8 @@
         </p:nvSpPr>
         <p:spPr>
           <a:xfrm>
-            <a:off x="457200" y="2174875"/>
-            <a:ext cx="4040188" cy="3951288"/>
+            <a:off x="609600" y="2174875"/>
+            <a:ext cx="5386917" cy="3951288"/>
           </a:xfrm>
         </p:spPr>
         <p:txBody>
@@ -1614,8 +1636,8 @@
         </p:nvSpPr>
         <p:spPr>
           <a:xfrm>
-            <a:off x="4645025" y="1535113"/>
-            <a:ext cx="4041775" cy="639762"/>
+            <a:off x="6193368" y="1535113"/>
+            <a:ext cx="5389033" cy="639762"/>
           </a:xfrm>
         </p:spPr>
         <p:txBody>
@@ -1679,8 +1701,8 @@
         </p:nvSpPr>
         <p:spPr>
           <a:xfrm>
-            <a:off x="4645025" y="2174875"/>
-            <a:ext cx="4041775" cy="3951288"/>
+            <a:off x="6193368" y="2174875"/>
+            <a:ext cx="5389033" cy="3951288"/>
           </a:xfrm>
         </p:spPr>
         <p:txBody>
@@ -1768,7 +1790,7 @@
           <a:p>
             <a:fld id="{5BCAD085-E8A6-8845-BD4E-CB4CCA059FC4}" type="datetimeFigureOut">
               <a:rPr lang="en-US" smtClean="0"/>
-              <a:t>10/31/25</a:t>
+              <a:t>11/1/25</a:t>
             </a:fld>
             <a:endParaRPr lang="en-US"/>
           </a:p>
@@ -1885,7 +1907,7 @@
           <a:p>
             <a:fld id="{5BCAD085-E8A6-8845-BD4E-CB4CCA059FC4}" type="datetimeFigureOut">
               <a:rPr lang="en-US" smtClean="0"/>
-              <a:t>10/31/25</a:t>
+              <a:t>11/1/25</a:t>
             </a:fld>
             <a:endParaRPr lang="en-US"/>
           </a:p>
@@ -1980,7 +2002,7 @@
           <a:p>
             <a:fld id="{5BCAD085-E8A6-8845-BD4E-CB4CCA059FC4}" type="datetimeFigureOut">
               <a:rPr lang="en-US" smtClean="0"/>
-              <a:t>10/31/25</a:t>
+              <a:t>11/1/25</a:t>
             </a:fld>
             <a:endParaRPr lang="en-US"/>
           </a:p>
@@ -2070,8 +2092,8 @@
         </p:nvSpPr>
         <p:spPr>
           <a:xfrm>
-            <a:off x="457200" y="273050"/>
-            <a:ext cx="3008313" cy="1162050"/>
+            <a:off x="609601" y="273050"/>
+            <a:ext cx="4011084" cy="1162050"/>
           </a:xfrm>
         </p:spPr>
         <p:txBody>
@@ -2101,8 +2123,8 @@
         </p:nvSpPr>
         <p:spPr>
           <a:xfrm>
-            <a:off x="3575050" y="273050"/>
-            <a:ext cx="5111750" cy="5853113"/>
+            <a:off x="4766733" y="273051"/>
+            <a:ext cx="6815667" cy="5853113"/>
           </a:xfrm>
         </p:spPr>
         <p:txBody>
@@ -2185,8 +2207,8 @@
         </p:nvSpPr>
         <p:spPr>
           <a:xfrm>
-            <a:off x="457200" y="1435100"/>
-            <a:ext cx="3008313" cy="4691063"/>
+            <a:off x="609601" y="1435101"/>
+            <a:ext cx="4011084" cy="4691063"/>
           </a:xfrm>
         </p:spPr>
         <p:txBody>
@@ -2255,7 +2277,7 @@
           <a:p>
             <a:fld id="{5BCAD085-E8A6-8845-BD4E-CB4CCA059FC4}" type="datetimeFigureOut">
               <a:rPr lang="en-US" smtClean="0"/>
-              <a:t>10/31/25</a:t>
+              <a:t>11/1/25</a:t>
             </a:fld>
             <a:endParaRPr lang="en-US"/>
           </a:p>
@@ -2345,8 +2367,8 @@
         </p:nvSpPr>
         <p:spPr>
           <a:xfrm>
-            <a:off x="1792288" y="4800600"/>
-            <a:ext cx="5486400" cy="566738"/>
+            <a:off x="2389717" y="4800600"/>
+            <a:ext cx="7315200" cy="566738"/>
           </a:xfrm>
         </p:spPr>
         <p:txBody>
@@ -2376,8 +2398,8 @@
         </p:nvSpPr>
         <p:spPr>
           <a:xfrm>
-            <a:off x="1792288" y="612775"/>
-            <a:ext cx="5486400" cy="4114800"/>
+            <a:off x="2389717" y="612775"/>
+            <a:ext cx="7315200" cy="4114800"/>
           </a:xfrm>
         </p:spPr>
         <p:txBody>
@@ -2437,8 +2459,8 @@
         </p:nvSpPr>
         <p:spPr>
           <a:xfrm>
-            <a:off x="1792288" y="5367338"/>
-            <a:ext cx="5486400" cy="804862"/>
+            <a:off x="2389717" y="5367338"/>
+            <a:ext cx="7315200" cy="804862"/>
           </a:xfrm>
         </p:spPr>
         <p:txBody>
@@ -2507,7 +2529,7 @@
           <a:p>
             <a:fld id="{5BCAD085-E8A6-8845-BD4E-CB4CCA059FC4}" type="datetimeFigureOut">
               <a:rPr lang="en-US" smtClean="0"/>
-              <a:t>10/31/25</a:t>
+              <a:t>11/1/25</a:t>
             </a:fld>
             <a:endParaRPr lang="en-US"/>
           </a:p>
@@ -2602,8 +2624,8 @@
         </p:nvSpPr>
         <p:spPr>
           <a:xfrm>
-            <a:off x="457200" y="274638"/>
-            <a:ext cx="8229600" cy="1143000"/>
+            <a:off x="609600" y="274638"/>
+            <a:ext cx="10972800" cy="1143000"/>
           </a:xfrm>
           <a:prstGeom prst="rect">
             <a:avLst/>
@@ -2634,8 +2656,8 @@
         </p:nvSpPr>
         <p:spPr>
           <a:xfrm>
-            <a:off x="457200" y="1600200"/>
-            <a:ext cx="8229600" cy="4525963"/>
+            <a:off x="609600" y="1600201"/>
+            <a:ext cx="10972800" cy="4525963"/>
           </a:xfrm>
           <a:prstGeom prst="rect">
             <a:avLst/>
@@ -2695,8 +2717,8 @@
         </p:nvSpPr>
         <p:spPr>
           <a:xfrm>
-            <a:off x="457200" y="6356350"/>
-            <a:ext cx="2133600" cy="365125"/>
+            <a:off x="609600" y="6356351"/>
+            <a:ext cx="2844800" cy="365125"/>
           </a:xfrm>
           <a:prstGeom prst="rect">
             <a:avLst/>
@@ -2718,7 +2740,7 @@
           <a:p>
             <a:fld id="{5BCAD085-E8A6-8845-BD4E-CB4CCA059FC4}" type="datetimeFigureOut">
               <a:rPr lang="en-US" smtClean="0"/>
-              <a:t>10/31/25</a:t>
+              <a:t>11/1/25</a:t>
             </a:fld>
             <a:endParaRPr lang="en-US"/>
           </a:p>
@@ -2736,8 +2758,8 @@
         </p:nvSpPr>
         <p:spPr>
           <a:xfrm>
-            <a:off x="3124200" y="6356350"/>
-            <a:ext cx="2895600" cy="365125"/>
+            <a:off x="4165600" y="6356351"/>
+            <a:ext cx="3860800" cy="365125"/>
           </a:xfrm>
           <a:prstGeom prst="rect">
             <a:avLst/>
@@ -2773,8 +2795,8 @@
         </p:nvSpPr>
         <p:spPr>
           <a:xfrm>
-            <a:off x="6553200" y="6356350"/>
-            <a:ext cx="2133600" cy="365125"/>
+            <a:off x="8737600" y="6356351"/>
+            <a:ext cx="2844800" cy="365125"/>
           </a:xfrm>
           <a:prstGeom prst="rect">
             <a:avLst/>
@@ -3106,7 +3128,7 @@
         <p:spPr/>
         <p:txBody>
           <a:bodyPr>
-            <a:normAutofit fontScale="90000"/>
+            <a:normAutofit/>
           </a:bodyPr>
           <a:lstStyle/>
           <a:p>
@@ -3186,7 +3208,7 @@
         </p:nvSpPr>
         <p:spPr>
           <a:xfrm>
-            <a:off x="457200" y="274638"/>
+            <a:off x="1981200" y="0"/>
             <a:ext cx="8229600" cy="403054"/>
           </a:xfrm>
         </p:spPr>
@@ -3205,10 +3227,10 @@
       </p:sp>
       <p:pic>
         <p:nvPicPr>
-          <p:cNvPr id="5" name="Picture 4">
+          <p:cNvPr id="3" name="Picture 2">
             <a:extLst>
               <a:ext uri="{FF2B5EF4-FFF2-40B4-BE49-F238E27FC236}">
-                <a16:creationId xmlns:a16="http://schemas.microsoft.com/office/drawing/2014/main" id="{E8DBE65A-FBDA-2BF5-0D15-813A1DAB8B5F}"/>
+                <a16:creationId xmlns:a16="http://schemas.microsoft.com/office/drawing/2014/main" id="{763CF008-7154-D721-5A2F-EAEC7DA60B47}"/>
               </a:ext>
             </a:extLst>
           </p:cNvPr>
@@ -3225,8 +3247,8 @@
         </p:blipFill>
         <p:spPr>
           <a:xfrm>
-            <a:off x="685800" y="1025992"/>
-            <a:ext cx="7772400" cy="5627107"/>
+            <a:off x="1822064" y="477509"/>
+            <a:ext cx="8547872" cy="6219000"/>
           </a:xfrm>
           <a:prstGeom prst="rect">
             <a:avLst/>
@@ -3313,8 +3335,8 @@
         </p:blipFill>
         <p:spPr>
           <a:xfrm>
-            <a:off x="0" y="2339185"/>
-            <a:ext cx="9088015" cy="1817603"/>
+            <a:off x="276022" y="2265004"/>
+            <a:ext cx="11639955" cy="2327991"/>
           </a:xfrm>
           <a:prstGeom prst="rect">
             <a:avLst/>
@@ -3369,7 +3391,7 @@
         </p:nvSpPr>
         <p:spPr>
           <a:xfrm>
-            <a:off x="457200" y="274638"/>
+            <a:off x="1981200" y="274639"/>
             <a:ext cx="8229600" cy="537125"/>
           </a:xfrm>
         </p:spPr>
@@ -3408,7 +3430,7 @@
         </p:blipFill>
         <p:spPr>
           <a:xfrm>
-            <a:off x="844420" y="863081"/>
+            <a:off x="2368420" y="863082"/>
             <a:ext cx="7772400" cy="5850275"/>
           </a:xfrm>
           <a:prstGeom prst="rect">
@@ -3420,6 +3442,101 @@
     <p:extLst>
       <p:ext uri="{BB962C8B-B14F-4D97-AF65-F5344CB8AC3E}">
         <p14:creationId xmlns:p14="http://schemas.microsoft.com/office/powerpoint/2010/main" val="3020544105"/>
+      </p:ext>
+    </p:extLst>
+  </p:cSld>
+  <p:clrMapOvr>
+    <a:masterClrMapping/>
+  </p:clrMapOvr>
+</p:sld>
+</file>
+
+<file path=ppt/slides/slide5.xml><?xml version="1.0" encoding="utf-8"?>
+<p:sld xmlns:a="http://schemas.openxmlformats.org/drawingml/2006/main" xmlns:r="http://schemas.openxmlformats.org/officeDocument/2006/relationships" xmlns:p="http://schemas.openxmlformats.org/presentationml/2006/main">
+  <p:cSld>
+    <p:spTree>
+      <p:nvGrpSpPr>
+        <p:cNvPr id="1" name=""/>
+        <p:cNvGrpSpPr/>
+        <p:nvPr/>
+      </p:nvGrpSpPr>
+      <p:grpSpPr>
+        <a:xfrm>
+          <a:off x="0" y="0"/>
+          <a:ext cx="0" cy="0"/>
+          <a:chOff x="0" y="0"/>
+          <a:chExt cx="0" cy="0"/>
+        </a:xfrm>
+      </p:grpSpPr>
+      <p:sp>
+        <p:nvSpPr>
+          <p:cNvPr id="2" name="Title 1">
+            <a:extLst>
+              <a:ext uri="{FF2B5EF4-FFF2-40B4-BE49-F238E27FC236}">
+                <a16:creationId xmlns:a16="http://schemas.microsoft.com/office/drawing/2014/main" id="{935473C5-DBD4-48E3-CD83-DA6D76779DC1}"/>
+              </a:ext>
+            </a:extLst>
+          </p:cNvPr>
+          <p:cNvSpPr>
+            <a:spLocks noGrp="1"/>
+          </p:cNvSpPr>
+          <p:nvPr>
+            <p:ph type="title"/>
+          </p:nvPr>
+        </p:nvSpPr>
+        <p:spPr>
+          <a:xfrm>
+            <a:off x="2142300" y="89444"/>
+            <a:ext cx="8229600" cy="393182"/>
+          </a:xfrm>
+        </p:spPr>
+        <p:txBody>
+          <a:bodyPr>
+            <a:normAutofit fontScale="90000"/>
+          </a:bodyPr>
+          <a:lstStyle/>
+          <a:p>
+            <a:r>
+              <a:rPr lang="en-US" dirty="0"/>
+              <a:t>Architecture Diagram</a:t>
+            </a:r>
+          </a:p>
+        </p:txBody>
+      </p:sp>
+      <p:pic>
+        <p:nvPicPr>
+          <p:cNvPr id="6" name="Picture 5">
+            <a:extLst>
+              <a:ext uri="{FF2B5EF4-FFF2-40B4-BE49-F238E27FC236}">
+                <a16:creationId xmlns:a16="http://schemas.microsoft.com/office/drawing/2014/main" id="{A6D65210-0EDC-4A69-8E8A-CD9FFE81D80C}"/>
+              </a:ext>
+            </a:extLst>
+          </p:cNvPr>
+          <p:cNvPicPr>
+            <a:picLocks noChangeAspect="1"/>
+          </p:cNvPicPr>
+          <p:nvPr/>
+        </p:nvPicPr>
+        <p:blipFill>
+          <a:blip r:embed="rId2"/>
+          <a:stretch>
+            <a:fillRect/>
+          </a:stretch>
+        </p:blipFill>
+        <p:spPr>
+          <a:xfrm>
+            <a:off x="387891" y="625033"/>
+            <a:ext cx="11416217" cy="6143523"/>
+          </a:xfrm>
+          <a:prstGeom prst="rect">
+            <a:avLst/>
+          </a:prstGeom>
+        </p:spPr>
+      </p:pic>
+    </p:spTree>
+    <p:extLst>
+      <p:ext uri="{BB962C8B-B14F-4D97-AF65-F5344CB8AC3E}">
+        <p14:creationId xmlns:p14="http://schemas.microsoft.com/office/powerpoint/2010/main" val="345487456"/>
       </p:ext>
     </p:extLst>
   </p:cSld>

</xml_diff>

<commit_message>
docs added for agent approval PROD sol
</commit_message>
<xml_diff>
--- a/ccg-presentation/CCG_Readout.pptx
+++ b/ccg-presentation/CCG_Readout.pptx
@@ -10,6 +10,8 @@
     <p:sldId id="260" r:id="rId4"/>
     <p:sldId id="261" r:id="rId5"/>
     <p:sldId id="263" r:id="rId6"/>
+    <p:sldId id="264" r:id="rId7"/>
+    <p:sldId id="265" r:id="rId8"/>
   </p:sldIdLst>
   <p:sldSz cx="12192000" cy="6858000"/>
   <p:notesSz cx="6858000" cy="9144000"/>
@@ -123,10 +125,15 @@
             <p14:sldId id="261"/>
           </p14:sldIdLst>
         </p14:section>
-        <p14:section name="MULTI-AGENT SOLUTION" id="{C5241651-0464-AA44-A89A-AD0B10E3611B}">
+        <p14:section name="MULTI-AGENT SOLUTION - DEV" id="{C5241651-0464-AA44-A89A-AD0B10E3611B}">
           <p14:sldIdLst>
             <p14:sldId id="263"/>
+            <p14:sldId id="264"/>
+            <p14:sldId id="265"/>
           </p14:sldIdLst>
+        </p14:section>
+        <p14:section name="Untitled Section" id="{0E45B361-04AA-1A48-B097-4896808315A4}">
+          <p14:sldIdLst/>
         </p14:section>
       </p14:sectionLst>
     </p:ext>
@@ -3537,6 +3544,189 @@
     <p:extLst>
       <p:ext uri="{BB962C8B-B14F-4D97-AF65-F5344CB8AC3E}">
         <p14:creationId xmlns:p14="http://schemas.microsoft.com/office/powerpoint/2010/main" val="345487456"/>
+      </p:ext>
+    </p:extLst>
+  </p:cSld>
+  <p:clrMapOvr>
+    <a:masterClrMapping/>
+  </p:clrMapOvr>
+</p:sld>
+</file>
+
+<file path=ppt/slides/slide6.xml><?xml version="1.0" encoding="utf-8"?>
+<p:sld xmlns:a="http://schemas.openxmlformats.org/drawingml/2006/main" xmlns:r="http://schemas.openxmlformats.org/officeDocument/2006/relationships" xmlns:p="http://schemas.openxmlformats.org/presentationml/2006/main">
+  <p:cSld>
+    <p:spTree>
+      <p:nvGrpSpPr>
+        <p:cNvPr id="1" name=""/>
+        <p:cNvGrpSpPr/>
+        <p:nvPr/>
+      </p:nvGrpSpPr>
+      <p:grpSpPr>
+        <a:xfrm>
+          <a:off x="0" y="0"/>
+          <a:ext cx="0" cy="0"/>
+          <a:chOff x="0" y="0"/>
+          <a:chExt cx="0" cy="0"/>
+        </a:xfrm>
+      </p:grpSpPr>
+      <p:sp>
+        <p:nvSpPr>
+          <p:cNvPr id="2" name="Title 1">
+            <a:extLst>
+              <a:ext uri="{FF2B5EF4-FFF2-40B4-BE49-F238E27FC236}">
+                <a16:creationId xmlns:a16="http://schemas.microsoft.com/office/drawing/2014/main" id="{E9F36458-EBEA-2ECC-DCFC-3290950D1A75}"/>
+              </a:ext>
+            </a:extLst>
+          </p:cNvPr>
+          <p:cNvSpPr>
+            <a:spLocks noGrp="1"/>
+          </p:cNvSpPr>
+          <p:nvPr>
+            <p:ph type="title"/>
+          </p:nvPr>
+        </p:nvSpPr>
+        <p:spPr/>
+        <p:txBody>
+          <a:bodyPr/>
+          <a:lstStyle/>
+          <a:p>
+            <a:r>
+              <a:rPr lang="en-US" dirty="0"/>
+              <a:t>Workflow Manager Diagram</a:t>
+            </a:r>
+          </a:p>
+        </p:txBody>
+      </p:sp>
+      <p:pic>
+        <p:nvPicPr>
+          <p:cNvPr id="4" name="Picture 3">
+            <a:extLst>
+              <a:ext uri="{FF2B5EF4-FFF2-40B4-BE49-F238E27FC236}">
+                <a16:creationId xmlns:a16="http://schemas.microsoft.com/office/drawing/2014/main" id="{217C394D-BAF1-729F-EE82-34FBC7CFA764}"/>
+              </a:ext>
+            </a:extLst>
+          </p:cNvPr>
+          <p:cNvPicPr>
+            <a:picLocks noChangeAspect="1"/>
+          </p:cNvPicPr>
+          <p:nvPr/>
+        </p:nvPicPr>
+        <p:blipFill>
+          <a:blip r:embed="rId2"/>
+          <a:stretch>
+            <a:fillRect/>
+          </a:stretch>
+        </p:blipFill>
+        <p:spPr>
+          <a:xfrm>
+            <a:off x="30275" y="1856159"/>
+            <a:ext cx="12131449" cy="3145681"/>
+          </a:xfrm>
+          <a:prstGeom prst="rect">
+            <a:avLst/>
+          </a:prstGeom>
+        </p:spPr>
+      </p:pic>
+    </p:spTree>
+    <p:extLst>
+      <p:ext uri="{BB962C8B-B14F-4D97-AF65-F5344CB8AC3E}">
+        <p14:creationId xmlns:p14="http://schemas.microsoft.com/office/powerpoint/2010/main" val="965371583"/>
+      </p:ext>
+    </p:extLst>
+  </p:cSld>
+  <p:clrMapOvr>
+    <a:masterClrMapping/>
+  </p:clrMapOvr>
+</p:sld>
+</file>
+
+<file path=ppt/slides/slide7.xml><?xml version="1.0" encoding="utf-8"?>
+<p:sld xmlns:a="http://schemas.openxmlformats.org/drawingml/2006/main" xmlns:r="http://schemas.openxmlformats.org/officeDocument/2006/relationships" xmlns:p="http://schemas.openxmlformats.org/presentationml/2006/main">
+  <p:cSld>
+    <p:spTree>
+      <p:nvGrpSpPr>
+        <p:cNvPr id="1" name=""/>
+        <p:cNvGrpSpPr/>
+        <p:nvPr/>
+      </p:nvGrpSpPr>
+      <p:grpSpPr>
+        <a:xfrm>
+          <a:off x="0" y="0"/>
+          <a:ext cx="0" cy="0"/>
+          <a:chOff x="0" y="0"/>
+          <a:chExt cx="0" cy="0"/>
+        </a:xfrm>
+      </p:grpSpPr>
+      <p:sp>
+        <p:nvSpPr>
+          <p:cNvPr id="2" name="Title 1">
+            <a:extLst>
+              <a:ext uri="{FF2B5EF4-FFF2-40B4-BE49-F238E27FC236}">
+                <a16:creationId xmlns:a16="http://schemas.microsoft.com/office/drawing/2014/main" id="{D6279912-5532-C200-3CD5-699A78AE9899}"/>
+              </a:ext>
+            </a:extLst>
+          </p:cNvPr>
+          <p:cNvSpPr>
+            <a:spLocks noGrp="1"/>
+          </p:cNvSpPr>
+          <p:nvPr>
+            <p:ph type="title"/>
+          </p:nvPr>
+        </p:nvSpPr>
+        <p:spPr>
+          <a:xfrm>
+            <a:off x="609600" y="124280"/>
+            <a:ext cx="10972800" cy="300715"/>
+          </a:xfrm>
+        </p:spPr>
+        <p:txBody>
+          <a:bodyPr>
+            <a:normAutofit fontScale="90000"/>
+          </a:bodyPr>
+          <a:lstStyle/>
+          <a:p>
+            <a:r>
+              <a:rPr lang="en-US" dirty="0"/>
+              <a:t>Sequence Diagram</a:t>
+            </a:r>
+          </a:p>
+        </p:txBody>
+      </p:sp>
+      <p:pic>
+        <p:nvPicPr>
+          <p:cNvPr id="4" name="Picture 3">
+            <a:extLst>
+              <a:ext uri="{FF2B5EF4-FFF2-40B4-BE49-F238E27FC236}">
+                <a16:creationId xmlns:a16="http://schemas.microsoft.com/office/drawing/2014/main" id="{07AFFF90-59AC-C58B-7D83-37A456F335AF}"/>
+              </a:ext>
+            </a:extLst>
+          </p:cNvPr>
+          <p:cNvPicPr>
+            <a:picLocks noChangeAspect="1"/>
+          </p:cNvPicPr>
+          <p:nvPr/>
+        </p:nvPicPr>
+        <p:blipFill>
+          <a:blip r:embed="rId2"/>
+          <a:stretch>
+            <a:fillRect/>
+          </a:stretch>
+        </p:blipFill>
+        <p:spPr>
+          <a:xfrm>
+            <a:off x="1552253" y="652539"/>
+            <a:ext cx="8691081" cy="5930823"/>
+          </a:xfrm>
+          <a:prstGeom prst="rect">
+            <a:avLst/>
+          </a:prstGeom>
+        </p:spPr>
+      </p:pic>
+    </p:spTree>
+    <p:extLst>
+      <p:ext uri="{BB962C8B-B14F-4D97-AF65-F5344CB8AC3E}">
+        <p14:creationId xmlns:p14="http://schemas.microsoft.com/office/powerpoint/2010/main" val="3449458215"/>
       </p:ext>
     </p:extLst>
   </p:cSld>

</xml_diff>